<commit_message>
Update texte and images
</commit_message>
<xml_diff>
--- a/docs/Home-Assistant/Images/wire.pptx
+++ b/docs/Home-Assistant/Images/wire.pptx
@@ -7,6 +7,8 @@
   <p:sldIdLst>
     <p:sldId id="256" r:id="rId2"/>
     <p:sldId id="257" r:id="rId3"/>
+    <p:sldId id="258" r:id="rId4"/>
+    <p:sldId id="259" r:id="rId5"/>
   </p:sldIdLst>
   <p:sldSz cx="12192000" cy="6858000"/>
   <p:notesSz cx="6858000" cy="9144000"/>
@@ -260,7 +262,7 @@
           <a:p>
             <a:fld id="{548CA341-7FB4-A74E-ACD9-B131A62C6628}" type="datetimeFigureOut">
               <a:rPr lang="fr-FR" smtClean="0"/>
-              <a:t>11/11/2024</a:t>
+              <a:t>15/12/2024</a:t>
             </a:fld>
             <a:endParaRPr lang="fr-FR"/>
           </a:p>
@@ -458,7 +460,7 @@
           <a:p>
             <a:fld id="{548CA341-7FB4-A74E-ACD9-B131A62C6628}" type="datetimeFigureOut">
               <a:rPr lang="fr-FR" smtClean="0"/>
-              <a:t>11/11/2024</a:t>
+              <a:t>15/12/2024</a:t>
             </a:fld>
             <a:endParaRPr lang="fr-FR"/>
           </a:p>
@@ -666,7 +668,7 @@
           <a:p>
             <a:fld id="{548CA341-7FB4-A74E-ACD9-B131A62C6628}" type="datetimeFigureOut">
               <a:rPr lang="fr-FR" smtClean="0"/>
-              <a:t>11/11/2024</a:t>
+              <a:t>15/12/2024</a:t>
             </a:fld>
             <a:endParaRPr lang="fr-FR"/>
           </a:p>
@@ -864,7 +866,7 @@
           <a:p>
             <a:fld id="{548CA341-7FB4-A74E-ACD9-B131A62C6628}" type="datetimeFigureOut">
               <a:rPr lang="fr-FR" smtClean="0"/>
-              <a:t>11/11/2024</a:t>
+              <a:t>15/12/2024</a:t>
             </a:fld>
             <a:endParaRPr lang="fr-FR"/>
           </a:p>
@@ -1139,7 +1141,7 @@
           <a:p>
             <a:fld id="{548CA341-7FB4-A74E-ACD9-B131A62C6628}" type="datetimeFigureOut">
               <a:rPr lang="fr-FR" smtClean="0"/>
-              <a:t>11/11/2024</a:t>
+              <a:t>15/12/2024</a:t>
             </a:fld>
             <a:endParaRPr lang="fr-FR"/>
           </a:p>
@@ -1404,7 +1406,7 @@
           <a:p>
             <a:fld id="{548CA341-7FB4-A74E-ACD9-B131A62C6628}" type="datetimeFigureOut">
               <a:rPr lang="fr-FR" smtClean="0"/>
-              <a:t>11/11/2024</a:t>
+              <a:t>15/12/2024</a:t>
             </a:fld>
             <a:endParaRPr lang="fr-FR"/>
           </a:p>
@@ -1816,7 +1818,7 @@
           <a:p>
             <a:fld id="{548CA341-7FB4-A74E-ACD9-B131A62C6628}" type="datetimeFigureOut">
               <a:rPr lang="fr-FR" smtClean="0"/>
-              <a:t>11/11/2024</a:t>
+              <a:t>15/12/2024</a:t>
             </a:fld>
             <a:endParaRPr lang="fr-FR"/>
           </a:p>
@@ -1957,7 +1959,7 @@
           <a:p>
             <a:fld id="{548CA341-7FB4-A74E-ACD9-B131A62C6628}" type="datetimeFigureOut">
               <a:rPr lang="fr-FR" smtClean="0"/>
-              <a:t>11/11/2024</a:t>
+              <a:t>15/12/2024</a:t>
             </a:fld>
             <a:endParaRPr lang="fr-FR"/>
           </a:p>
@@ -2070,7 +2072,7 @@
           <a:p>
             <a:fld id="{548CA341-7FB4-A74E-ACD9-B131A62C6628}" type="datetimeFigureOut">
               <a:rPr lang="fr-FR" smtClean="0"/>
-              <a:t>11/11/2024</a:t>
+              <a:t>15/12/2024</a:t>
             </a:fld>
             <a:endParaRPr lang="fr-FR"/>
           </a:p>
@@ -2381,7 +2383,7 @@
           <a:p>
             <a:fld id="{548CA341-7FB4-A74E-ACD9-B131A62C6628}" type="datetimeFigureOut">
               <a:rPr lang="fr-FR" smtClean="0"/>
-              <a:t>11/11/2024</a:t>
+              <a:t>15/12/2024</a:t>
             </a:fld>
             <a:endParaRPr lang="fr-FR"/>
           </a:p>
@@ -2669,7 +2671,7 @@
           <a:p>
             <a:fld id="{548CA341-7FB4-A74E-ACD9-B131A62C6628}" type="datetimeFigureOut">
               <a:rPr lang="fr-FR" smtClean="0"/>
-              <a:t>11/11/2024</a:t>
+              <a:t>15/12/2024</a:t>
             </a:fld>
             <a:endParaRPr lang="fr-FR"/>
           </a:p>
@@ -2910,7 +2912,7 @@
           <a:p>
             <a:fld id="{548CA341-7FB4-A74E-ACD9-B131A62C6628}" type="datetimeFigureOut">
               <a:rPr lang="fr-FR" smtClean="0"/>
-              <a:t>11/11/2024</a:t>
+              <a:t>15/12/2024</a:t>
             </a:fld>
             <a:endParaRPr lang="fr-FR"/>
           </a:p>
@@ -5756,6 +5758,1159 @@
 </p:sld>
 </file>
 
+<file path=ppt/slides/slide3.xml><?xml version="1.0" encoding="utf-8"?>
+<p:sld xmlns:a="http://schemas.openxmlformats.org/drawingml/2006/main" xmlns:r="http://schemas.openxmlformats.org/officeDocument/2006/relationships" xmlns:p="http://schemas.openxmlformats.org/presentationml/2006/main">
+  <p:cSld>
+    <p:spTree>
+      <p:nvGrpSpPr>
+        <p:cNvPr id="1" name=""/>
+        <p:cNvGrpSpPr/>
+        <p:nvPr/>
+      </p:nvGrpSpPr>
+      <p:grpSpPr>
+        <a:xfrm>
+          <a:off x="0" y="0"/>
+          <a:ext cx="0" cy="0"/>
+          <a:chOff x="0" y="0"/>
+          <a:chExt cx="0" cy="0"/>
+        </a:xfrm>
+      </p:grpSpPr>
+      <p:pic>
+        <p:nvPicPr>
+          <p:cNvPr id="5" name="Image 4" descr="Une image contenant texte, Police&#10;&#10;Description générée automatiquement">
+            <a:extLst>
+              <a:ext uri="{FF2B5EF4-FFF2-40B4-BE49-F238E27FC236}">
+                <a16:creationId xmlns:a16="http://schemas.microsoft.com/office/drawing/2014/main" id="{B8F5E8A3-777C-BF7D-A315-E199709738A7}"/>
+              </a:ext>
+            </a:extLst>
+          </p:cNvPr>
+          <p:cNvPicPr>
+            <a:picLocks noChangeAspect="1"/>
+          </p:cNvPicPr>
+          <p:nvPr/>
+        </p:nvPicPr>
+        <p:blipFill>
+          <a:blip r:embed="rId2">
+            <a:clrChange>
+              <a:clrFrom>
+                <a:srgbClr val="FFFFFF"/>
+              </a:clrFrom>
+              <a:clrTo>
+                <a:srgbClr val="FFFFFF">
+                  <a:alpha val="0"/>
+                </a:srgbClr>
+              </a:clrTo>
+            </a:clrChange>
+          </a:blip>
+          <a:stretch>
+            <a:fillRect/>
+          </a:stretch>
+        </p:blipFill>
+        <p:spPr>
+          <a:xfrm>
+            <a:off x="5373178" y="4049058"/>
+            <a:ext cx="1421529" cy="1284514"/>
+          </a:xfrm>
+          <a:prstGeom prst="rect">
+            <a:avLst/>
+          </a:prstGeom>
+        </p:spPr>
+      </p:pic>
+      <p:pic>
+        <p:nvPicPr>
+          <p:cNvPr id="7" name="Image 6">
+            <a:extLst>
+              <a:ext uri="{FF2B5EF4-FFF2-40B4-BE49-F238E27FC236}">
+                <a16:creationId xmlns:a16="http://schemas.microsoft.com/office/drawing/2014/main" id="{7AE583E0-BF9E-C14E-7F0D-4335A2B0ADFE}"/>
+              </a:ext>
+            </a:extLst>
+          </p:cNvPr>
+          <p:cNvPicPr>
+            <a:picLocks noChangeAspect="1"/>
+          </p:cNvPicPr>
+          <p:nvPr/>
+        </p:nvPicPr>
+        <p:blipFill>
+          <a:blip r:embed="rId3">
+            <a:clrChange>
+              <a:clrFrom>
+                <a:srgbClr val="FFFFFF"/>
+              </a:clrFrom>
+              <a:clrTo>
+                <a:srgbClr val="FFFFFF">
+                  <a:alpha val="0"/>
+                </a:srgbClr>
+              </a:clrTo>
+            </a:clrChange>
+          </a:blip>
+          <a:stretch>
+            <a:fillRect/>
+          </a:stretch>
+        </p:blipFill>
+        <p:spPr>
+          <a:xfrm rot="2074204">
+            <a:off x="5558030" y="1953709"/>
+            <a:ext cx="945902" cy="945902"/>
+          </a:xfrm>
+          <a:prstGeom prst="rect">
+            <a:avLst/>
+          </a:prstGeom>
+        </p:spPr>
+      </p:pic>
+      <p:pic>
+        <p:nvPicPr>
+          <p:cNvPr id="9" name="Image 8" descr="Une image contenant Rectangle, capture d’écran, électroménager, fenêtre&#10;&#10;Description générée automatiquement">
+            <a:extLst>
+              <a:ext uri="{FF2B5EF4-FFF2-40B4-BE49-F238E27FC236}">
+                <a16:creationId xmlns:a16="http://schemas.microsoft.com/office/drawing/2014/main" id="{C94F1FF6-B959-E6E1-6DAA-D0133E4DD8C8}"/>
+              </a:ext>
+            </a:extLst>
+          </p:cNvPr>
+          <p:cNvPicPr>
+            <a:picLocks noChangeAspect="1"/>
+          </p:cNvPicPr>
+          <p:nvPr/>
+        </p:nvPicPr>
+        <p:blipFill>
+          <a:blip r:embed="rId4">
+            <a:clrChange>
+              <a:clrFrom>
+                <a:srgbClr val="FFFFFF">
+                  <a:alpha val="0"/>
+                </a:srgbClr>
+              </a:clrFrom>
+              <a:clrTo>
+                <a:srgbClr val="FFFFFF">
+                  <a:alpha val="0"/>
+                </a:srgbClr>
+              </a:clrTo>
+            </a:clrChange>
+          </a:blip>
+          <a:stretch>
+            <a:fillRect/>
+          </a:stretch>
+        </p:blipFill>
+        <p:spPr>
+          <a:xfrm>
+            <a:off x="1037749" y="1569615"/>
+            <a:ext cx="3175000" cy="3175000"/>
+          </a:xfrm>
+          <a:prstGeom prst="rect">
+            <a:avLst/>
+          </a:prstGeom>
+        </p:spPr>
+      </p:pic>
+      <p:pic>
+        <p:nvPicPr>
+          <p:cNvPr id="11" name="Image 10" descr="Une image contenant connecteur, câble, fils électriques&#10;&#10;Description générée automatiquement">
+            <a:extLst>
+              <a:ext uri="{FF2B5EF4-FFF2-40B4-BE49-F238E27FC236}">
+                <a16:creationId xmlns:a16="http://schemas.microsoft.com/office/drawing/2014/main" id="{ED5C58D3-76D4-0C2B-A717-AD7EB1421DB2}"/>
+              </a:ext>
+            </a:extLst>
+          </p:cNvPr>
+          <p:cNvPicPr>
+            <a:picLocks noChangeAspect="1"/>
+          </p:cNvPicPr>
+          <p:nvPr/>
+        </p:nvPicPr>
+        <p:blipFill>
+          <a:blip r:embed="rId5">
+            <a:clrChange>
+              <a:clrFrom>
+                <a:srgbClr val="FFFFFF"/>
+              </a:clrFrom>
+              <a:clrTo>
+                <a:srgbClr val="FFFFFF">
+                  <a:alpha val="0"/>
+                </a:srgbClr>
+              </a:clrTo>
+            </a:clrChange>
+            <a:alphaModFix/>
+          </a:blip>
+          <a:stretch>
+            <a:fillRect/>
+          </a:stretch>
+        </p:blipFill>
+        <p:spPr>
+          <a:xfrm rot="13469013">
+            <a:off x="7881109" y="2813093"/>
+            <a:ext cx="1491217" cy="1491217"/>
+          </a:xfrm>
+          <a:prstGeom prst="rect">
+            <a:avLst/>
+          </a:prstGeom>
+        </p:spPr>
+      </p:pic>
+      <p:cxnSp>
+        <p:nvCxnSpPr>
+          <p:cNvPr id="13" name="Connecteur droit 12">
+            <a:extLst>
+              <a:ext uri="{FF2B5EF4-FFF2-40B4-BE49-F238E27FC236}">
+                <a16:creationId xmlns:a16="http://schemas.microsoft.com/office/drawing/2014/main" id="{F2694581-26BF-D0EC-5837-E4AB78CD43BF}"/>
+              </a:ext>
+            </a:extLst>
+          </p:cNvPr>
+          <p:cNvCxnSpPr>
+            <a:cxnSpLocks/>
+          </p:cNvCxnSpPr>
+          <p:nvPr/>
+        </p:nvCxnSpPr>
+        <p:spPr>
+          <a:xfrm>
+            <a:off x="6248400" y="3550552"/>
+            <a:ext cx="1634613" cy="0"/>
+          </a:xfrm>
+          <a:prstGeom prst="line">
+            <a:avLst/>
+          </a:prstGeom>
+          <a:ln w="47625">
+            <a:solidFill>
+              <a:srgbClr val="FF0000"/>
+            </a:solidFill>
+          </a:ln>
+        </p:spPr>
+        <p:style>
+          <a:lnRef idx="1">
+            <a:schemeClr val="accent1"/>
+          </a:lnRef>
+          <a:fillRef idx="0">
+            <a:schemeClr val="accent1"/>
+          </a:fillRef>
+          <a:effectRef idx="0">
+            <a:schemeClr val="accent1"/>
+          </a:effectRef>
+          <a:fontRef idx="minor">
+            <a:schemeClr val="tx1"/>
+          </a:fontRef>
+        </p:style>
+      </p:cxnSp>
+      <p:cxnSp>
+        <p:nvCxnSpPr>
+          <p:cNvPr id="14" name="Connecteur droit 13">
+            <a:extLst>
+              <a:ext uri="{FF2B5EF4-FFF2-40B4-BE49-F238E27FC236}">
+                <a16:creationId xmlns:a16="http://schemas.microsoft.com/office/drawing/2014/main" id="{FEBFC8BB-5C0F-D99D-3765-341176B7156F}"/>
+              </a:ext>
+            </a:extLst>
+          </p:cNvPr>
+          <p:cNvCxnSpPr>
+            <a:cxnSpLocks/>
+          </p:cNvCxnSpPr>
+          <p:nvPr/>
+        </p:nvCxnSpPr>
+        <p:spPr>
+          <a:xfrm flipV="1">
+            <a:off x="6603902" y="3768725"/>
+            <a:ext cx="0" cy="254000"/>
+          </a:xfrm>
+          <a:prstGeom prst="line">
+            <a:avLst/>
+          </a:prstGeom>
+          <a:ln w="47625">
+            <a:solidFill>
+              <a:srgbClr val="00B0F0"/>
+            </a:solidFill>
+          </a:ln>
+        </p:spPr>
+        <p:style>
+          <a:lnRef idx="1">
+            <a:schemeClr val="accent1"/>
+          </a:lnRef>
+          <a:fillRef idx="0">
+            <a:schemeClr val="accent1"/>
+          </a:fillRef>
+          <a:effectRef idx="0">
+            <a:schemeClr val="accent1"/>
+          </a:effectRef>
+          <a:fontRef idx="minor">
+            <a:schemeClr val="tx1"/>
+          </a:fontRef>
+        </p:style>
+      </p:cxnSp>
+      <p:cxnSp>
+        <p:nvCxnSpPr>
+          <p:cNvPr id="16" name="Connecteur droit 15">
+            <a:extLst>
+              <a:ext uri="{FF2B5EF4-FFF2-40B4-BE49-F238E27FC236}">
+                <a16:creationId xmlns:a16="http://schemas.microsoft.com/office/drawing/2014/main" id="{30E2E54D-D833-91AD-76C2-78C81D012FA4}"/>
+              </a:ext>
+            </a:extLst>
+          </p:cNvPr>
+          <p:cNvCxnSpPr>
+            <a:cxnSpLocks/>
+          </p:cNvCxnSpPr>
+          <p:nvPr/>
+        </p:nvCxnSpPr>
+        <p:spPr>
+          <a:xfrm flipH="1">
+            <a:off x="6603902" y="3793282"/>
+            <a:ext cx="1271737" cy="0"/>
+          </a:xfrm>
+          <a:prstGeom prst="line">
+            <a:avLst/>
+          </a:prstGeom>
+          <a:ln w="47625">
+            <a:solidFill>
+              <a:srgbClr val="00B0F0"/>
+            </a:solidFill>
+          </a:ln>
+        </p:spPr>
+        <p:style>
+          <a:lnRef idx="1">
+            <a:schemeClr val="accent1"/>
+          </a:lnRef>
+          <a:fillRef idx="0">
+            <a:schemeClr val="accent1"/>
+          </a:fillRef>
+          <a:effectRef idx="0">
+            <a:schemeClr val="accent1"/>
+          </a:effectRef>
+          <a:fontRef idx="minor">
+            <a:schemeClr val="tx1"/>
+          </a:fontRef>
+        </p:style>
+      </p:cxnSp>
+      <p:cxnSp>
+        <p:nvCxnSpPr>
+          <p:cNvPr id="20" name="Connecteur droit 19">
+            <a:extLst>
+              <a:ext uri="{FF2B5EF4-FFF2-40B4-BE49-F238E27FC236}">
+                <a16:creationId xmlns:a16="http://schemas.microsoft.com/office/drawing/2014/main" id="{A5ED70D4-1999-9C61-D14C-E2F131C55443}"/>
+              </a:ext>
+            </a:extLst>
+          </p:cNvPr>
+          <p:cNvCxnSpPr>
+            <a:cxnSpLocks/>
+          </p:cNvCxnSpPr>
+          <p:nvPr/>
+        </p:nvCxnSpPr>
+        <p:spPr>
+          <a:xfrm flipV="1">
+            <a:off x="6272981" y="3550552"/>
+            <a:ext cx="0" cy="472173"/>
+          </a:xfrm>
+          <a:prstGeom prst="line">
+            <a:avLst/>
+          </a:prstGeom>
+          <a:ln w="47625">
+            <a:solidFill>
+              <a:srgbClr val="FF0000"/>
+            </a:solidFill>
+          </a:ln>
+        </p:spPr>
+        <p:style>
+          <a:lnRef idx="1">
+            <a:schemeClr val="accent1"/>
+          </a:lnRef>
+          <a:fillRef idx="0">
+            <a:schemeClr val="accent1"/>
+          </a:fillRef>
+          <a:effectRef idx="0">
+            <a:schemeClr val="accent1"/>
+          </a:effectRef>
+          <a:fontRef idx="minor">
+            <a:schemeClr val="tx1"/>
+          </a:fontRef>
+        </p:style>
+      </p:cxnSp>
+      <p:cxnSp>
+        <p:nvCxnSpPr>
+          <p:cNvPr id="24" name="Connecteur droit 23">
+            <a:extLst>
+              <a:ext uri="{FF2B5EF4-FFF2-40B4-BE49-F238E27FC236}">
+                <a16:creationId xmlns:a16="http://schemas.microsoft.com/office/drawing/2014/main" id="{B7E6A7F2-6DC1-91C4-9521-30F7F4116799}"/>
+              </a:ext>
+            </a:extLst>
+          </p:cNvPr>
+          <p:cNvCxnSpPr>
+            <a:cxnSpLocks/>
+          </p:cNvCxnSpPr>
+          <p:nvPr/>
+        </p:nvCxnSpPr>
+        <p:spPr>
+          <a:xfrm flipH="1">
+            <a:off x="4001318" y="3307448"/>
+            <a:ext cx="2473796" cy="0"/>
+          </a:xfrm>
+          <a:prstGeom prst="line">
+            <a:avLst/>
+          </a:prstGeom>
+          <a:ln w="47625">
+            <a:solidFill>
+              <a:schemeClr val="accent1"/>
+            </a:solidFill>
+          </a:ln>
+        </p:spPr>
+        <p:style>
+          <a:lnRef idx="1">
+            <a:schemeClr val="accent1"/>
+          </a:lnRef>
+          <a:fillRef idx="0">
+            <a:schemeClr val="accent1"/>
+          </a:fillRef>
+          <a:effectRef idx="0">
+            <a:schemeClr val="accent1"/>
+          </a:effectRef>
+          <a:fontRef idx="minor">
+            <a:schemeClr val="tx1"/>
+          </a:fontRef>
+        </p:style>
+      </p:cxnSp>
+      <p:cxnSp>
+        <p:nvCxnSpPr>
+          <p:cNvPr id="25" name="Connecteur droit 24">
+            <a:extLst>
+              <a:ext uri="{FF2B5EF4-FFF2-40B4-BE49-F238E27FC236}">
+                <a16:creationId xmlns:a16="http://schemas.microsoft.com/office/drawing/2014/main" id="{C8827EA4-22C8-9924-208D-A87BC168234B}"/>
+              </a:ext>
+            </a:extLst>
+          </p:cNvPr>
+          <p:cNvCxnSpPr>
+            <a:cxnSpLocks/>
+          </p:cNvCxnSpPr>
+          <p:nvPr/>
+        </p:nvCxnSpPr>
+        <p:spPr>
+          <a:xfrm flipH="1">
+            <a:off x="4001318" y="3434011"/>
+            <a:ext cx="1596207" cy="0"/>
+          </a:xfrm>
+          <a:prstGeom prst="line">
+            <a:avLst/>
+          </a:prstGeom>
+          <a:ln w="47625">
+            <a:solidFill>
+              <a:srgbClr val="FFC000"/>
+            </a:solidFill>
+          </a:ln>
+        </p:spPr>
+        <p:style>
+          <a:lnRef idx="1">
+            <a:schemeClr val="accent1"/>
+          </a:lnRef>
+          <a:fillRef idx="0">
+            <a:schemeClr val="accent1"/>
+          </a:fillRef>
+          <a:effectRef idx="0">
+            <a:schemeClr val="accent1"/>
+          </a:effectRef>
+          <a:fontRef idx="minor">
+            <a:schemeClr val="tx1"/>
+          </a:fontRef>
+        </p:style>
+      </p:cxnSp>
+      <p:cxnSp>
+        <p:nvCxnSpPr>
+          <p:cNvPr id="27" name="Connecteur droit 26">
+            <a:extLst>
+              <a:ext uri="{FF2B5EF4-FFF2-40B4-BE49-F238E27FC236}">
+                <a16:creationId xmlns:a16="http://schemas.microsoft.com/office/drawing/2014/main" id="{466E849F-8DAC-3712-C081-1F99963930F8}"/>
+              </a:ext>
+            </a:extLst>
+          </p:cNvPr>
+          <p:cNvCxnSpPr>
+            <a:cxnSpLocks/>
+          </p:cNvCxnSpPr>
+          <p:nvPr/>
+        </p:nvCxnSpPr>
+        <p:spPr>
+          <a:xfrm flipV="1">
+            <a:off x="5597525" y="3406775"/>
+            <a:ext cx="0" cy="615950"/>
+          </a:xfrm>
+          <a:prstGeom prst="line">
+            <a:avLst/>
+          </a:prstGeom>
+          <a:ln w="47625">
+            <a:solidFill>
+              <a:srgbClr val="FFC000"/>
+            </a:solidFill>
+          </a:ln>
+        </p:spPr>
+        <p:style>
+          <a:lnRef idx="1">
+            <a:schemeClr val="accent1"/>
+          </a:lnRef>
+          <a:fillRef idx="0">
+            <a:schemeClr val="accent1"/>
+          </a:fillRef>
+          <a:effectRef idx="0">
+            <a:schemeClr val="accent1"/>
+          </a:effectRef>
+          <a:fontRef idx="minor">
+            <a:schemeClr val="tx1"/>
+          </a:fontRef>
+        </p:style>
+      </p:cxnSp>
+      <p:cxnSp>
+        <p:nvCxnSpPr>
+          <p:cNvPr id="31" name="Connecteur droit 30">
+            <a:extLst>
+              <a:ext uri="{FF2B5EF4-FFF2-40B4-BE49-F238E27FC236}">
+                <a16:creationId xmlns:a16="http://schemas.microsoft.com/office/drawing/2014/main" id="{6E0FD270-AF03-7F66-B35C-C4164F2DD9F0}"/>
+              </a:ext>
+            </a:extLst>
+          </p:cNvPr>
+          <p:cNvCxnSpPr>
+            <a:cxnSpLocks/>
+          </p:cNvCxnSpPr>
+          <p:nvPr/>
+        </p:nvCxnSpPr>
+        <p:spPr>
+          <a:xfrm flipV="1">
+            <a:off x="6452419" y="3307448"/>
+            <a:ext cx="0" cy="715277"/>
+          </a:xfrm>
+          <a:prstGeom prst="line">
+            <a:avLst/>
+          </a:prstGeom>
+          <a:ln w="47625">
+            <a:solidFill>
+              <a:schemeClr val="accent1"/>
+            </a:solidFill>
+          </a:ln>
+        </p:spPr>
+        <p:style>
+          <a:lnRef idx="1">
+            <a:schemeClr val="accent1"/>
+          </a:lnRef>
+          <a:fillRef idx="0">
+            <a:schemeClr val="accent1"/>
+          </a:fillRef>
+          <a:effectRef idx="0">
+            <a:schemeClr val="accent1"/>
+          </a:effectRef>
+          <a:fontRef idx="minor">
+            <a:schemeClr val="tx1"/>
+          </a:fontRef>
+        </p:style>
+      </p:cxnSp>
+      <p:cxnSp>
+        <p:nvCxnSpPr>
+          <p:cNvPr id="36" name="Connecteur droit 35">
+            <a:extLst>
+              <a:ext uri="{FF2B5EF4-FFF2-40B4-BE49-F238E27FC236}">
+                <a16:creationId xmlns:a16="http://schemas.microsoft.com/office/drawing/2014/main" id="{9EC356E9-9D75-2043-9A36-52152D556DB1}"/>
+              </a:ext>
+            </a:extLst>
+          </p:cNvPr>
+          <p:cNvCxnSpPr>
+            <a:cxnSpLocks/>
+          </p:cNvCxnSpPr>
+          <p:nvPr/>
+        </p:nvCxnSpPr>
+        <p:spPr>
+          <a:xfrm flipV="1">
+            <a:off x="6095999" y="2868561"/>
+            <a:ext cx="0" cy="1154164"/>
+          </a:xfrm>
+          <a:prstGeom prst="line">
+            <a:avLst/>
+          </a:prstGeom>
+          <a:ln w="47625">
+            <a:solidFill>
+              <a:schemeClr val="accent2">
+                <a:lumMod val="75000"/>
+              </a:schemeClr>
+            </a:solidFill>
+          </a:ln>
+        </p:spPr>
+        <p:style>
+          <a:lnRef idx="1">
+            <a:schemeClr val="accent1"/>
+          </a:lnRef>
+          <a:fillRef idx="0">
+            <a:schemeClr val="accent1"/>
+          </a:fillRef>
+          <a:effectRef idx="0">
+            <a:schemeClr val="accent1"/>
+          </a:effectRef>
+          <a:fontRef idx="minor">
+            <a:schemeClr val="tx1"/>
+          </a:fontRef>
+        </p:style>
+      </p:cxnSp>
+      <p:cxnSp>
+        <p:nvCxnSpPr>
+          <p:cNvPr id="54" name="Connecteur droit 53">
+            <a:extLst>
+              <a:ext uri="{FF2B5EF4-FFF2-40B4-BE49-F238E27FC236}">
+                <a16:creationId xmlns:a16="http://schemas.microsoft.com/office/drawing/2014/main" id="{FD0F1CDB-BE02-785D-9580-4DE62AED46EF}"/>
+              </a:ext>
+            </a:extLst>
+          </p:cNvPr>
+          <p:cNvCxnSpPr>
+            <a:cxnSpLocks/>
+          </p:cNvCxnSpPr>
+          <p:nvPr/>
+        </p:nvCxnSpPr>
+        <p:spPr>
+          <a:xfrm flipV="1">
+            <a:off x="5782909" y="2426660"/>
+            <a:ext cx="0" cy="1596065"/>
+          </a:xfrm>
+          <a:prstGeom prst="line">
+            <a:avLst/>
+          </a:prstGeom>
+          <a:ln w="47625">
+            <a:solidFill>
+              <a:srgbClr val="00B0F0"/>
+            </a:solidFill>
+          </a:ln>
+        </p:spPr>
+        <p:style>
+          <a:lnRef idx="1">
+            <a:schemeClr val="accent1"/>
+          </a:lnRef>
+          <a:fillRef idx="0">
+            <a:schemeClr val="accent1"/>
+          </a:fillRef>
+          <a:effectRef idx="0">
+            <a:schemeClr val="accent1"/>
+          </a:effectRef>
+          <a:fontRef idx="minor">
+            <a:schemeClr val="tx1"/>
+          </a:fontRef>
+        </p:style>
+      </p:cxnSp>
+    </p:spTree>
+    <p:extLst>
+      <p:ext uri="{BB962C8B-B14F-4D97-AF65-F5344CB8AC3E}">
+        <p14:creationId xmlns:p14="http://schemas.microsoft.com/office/powerpoint/2010/main" val="2776438629"/>
+      </p:ext>
+    </p:extLst>
+  </p:cSld>
+  <p:clrMapOvr>
+    <a:masterClrMapping/>
+  </p:clrMapOvr>
+</p:sld>
+</file>
+
+<file path=ppt/slides/slide4.xml><?xml version="1.0" encoding="utf-8"?>
+<p:sld xmlns:a="http://schemas.openxmlformats.org/drawingml/2006/main" xmlns:r="http://schemas.openxmlformats.org/officeDocument/2006/relationships" xmlns:p="http://schemas.openxmlformats.org/presentationml/2006/main">
+  <p:cSld>
+    <p:spTree>
+      <p:nvGrpSpPr>
+        <p:cNvPr id="1" name=""/>
+        <p:cNvGrpSpPr/>
+        <p:nvPr/>
+      </p:nvGrpSpPr>
+      <p:grpSpPr>
+        <a:xfrm>
+          <a:off x="0" y="0"/>
+          <a:ext cx="0" cy="0"/>
+          <a:chOff x="0" y="0"/>
+          <a:chExt cx="0" cy="0"/>
+        </a:xfrm>
+      </p:grpSpPr>
+      <p:pic>
+        <p:nvPicPr>
+          <p:cNvPr id="4" name="Image 3" descr="Une image contenant Rectangle, capture d’écran, électroménager, fenêtre&#10;&#10;Description générée automatiquement">
+            <a:extLst>
+              <a:ext uri="{FF2B5EF4-FFF2-40B4-BE49-F238E27FC236}">
+                <a16:creationId xmlns:a16="http://schemas.microsoft.com/office/drawing/2014/main" id="{671604F1-43D0-5940-97E6-2D517365E15B}"/>
+              </a:ext>
+            </a:extLst>
+          </p:cNvPr>
+          <p:cNvPicPr>
+            <a:picLocks noChangeAspect="1"/>
+          </p:cNvPicPr>
+          <p:nvPr/>
+        </p:nvPicPr>
+        <p:blipFill>
+          <a:blip r:embed="rId2">
+            <a:clrChange>
+              <a:clrFrom>
+                <a:srgbClr val="FFFFFF">
+                  <a:alpha val="0"/>
+                </a:srgbClr>
+              </a:clrFrom>
+              <a:clrTo>
+                <a:srgbClr val="FFFFFF">
+                  <a:alpha val="0"/>
+                </a:srgbClr>
+              </a:clrTo>
+            </a:clrChange>
+          </a:blip>
+          <a:stretch>
+            <a:fillRect/>
+          </a:stretch>
+        </p:blipFill>
+        <p:spPr>
+          <a:xfrm>
+            <a:off x="8589895" y="2167441"/>
+            <a:ext cx="1805387" cy="1805387"/>
+          </a:xfrm>
+          <a:prstGeom prst="rect">
+            <a:avLst/>
+          </a:prstGeom>
+        </p:spPr>
+      </p:pic>
+      <p:pic>
+        <p:nvPicPr>
+          <p:cNvPr id="1026" name="Picture 2" descr="Télécharger Home Assistant (gratuit) Android, Windows, Mac, Linux, iOS -  Clubic">
+            <a:extLst>
+              <a:ext uri="{FF2B5EF4-FFF2-40B4-BE49-F238E27FC236}">
+                <a16:creationId xmlns:a16="http://schemas.microsoft.com/office/drawing/2014/main" id="{02C1768A-9132-687A-99B9-414DBAF83173}"/>
+              </a:ext>
+            </a:extLst>
+          </p:cNvPr>
+          <p:cNvPicPr>
+            <a:picLocks noChangeAspect="1" noChangeArrowheads="1"/>
+          </p:cNvPicPr>
+          <p:nvPr/>
+        </p:nvPicPr>
+        <p:blipFill>
+          <a:blip r:embed="rId3">
+            <a:extLst>
+              <a:ext uri="{28A0092B-C50C-407E-A947-70E740481C1C}">
+                <a14:useLocalDpi xmlns:a14="http://schemas.microsoft.com/office/drawing/2010/main" val="0"/>
+              </a:ext>
+            </a:extLst>
+          </a:blip>
+          <a:srcRect/>
+          <a:stretch>
+            <a:fillRect/>
+          </a:stretch>
+        </p:blipFill>
+        <p:spPr bwMode="auto">
+          <a:xfrm>
+            <a:off x="5985592" y="2638261"/>
+            <a:ext cx="842593" cy="842593"/>
+          </a:xfrm>
+          <a:prstGeom prst="rect">
+            <a:avLst/>
+          </a:prstGeom>
+          <a:noFill/>
+          <a:extLst>
+            <a:ext uri="{909E8E84-426E-40DD-AFC4-6F175D3DCCD1}">
+              <a14:hiddenFill xmlns:a14="http://schemas.microsoft.com/office/drawing/2010/main">
+                <a:solidFill>
+                  <a:srgbClr val="FFFFFF"/>
+                </a:solidFill>
+              </a14:hiddenFill>
+            </a:ext>
+          </a:extLst>
+        </p:spPr>
+      </p:pic>
+      <p:grpSp>
+        <p:nvGrpSpPr>
+          <p:cNvPr id="8" name="Groupe 7">
+            <a:extLst>
+              <a:ext uri="{FF2B5EF4-FFF2-40B4-BE49-F238E27FC236}">
+                <a16:creationId xmlns:a16="http://schemas.microsoft.com/office/drawing/2014/main" id="{927460CD-7104-E36D-2174-AF6E4828A367}"/>
+              </a:ext>
+            </a:extLst>
+          </p:cNvPr>
+          <p:cNvGrpSpPr/>
+          <p:nvPr/>
+        </p:nvGrpSpPr>
+        <p:grpSpPr>
+          <a:xfrm>
+            <a:off x="3084796" y="2222749"/>
+            <a:ext cx="1482930" cy="1499593"/>
+            <a:chOff x="3270666" y="1944303"/>
+            <a:chExt cx="2022640" cy="2045368"/>
+          </a:xfrm>
+        </p:grpSpPr>
+        <p:pic>
+          <p:nvPicPr>
+            <p:cNvPr id="1028" name="Picture 4" descr="AVATTO Zigbee Tuya ZWT100 Thermostat de Chauffage d'eau Intelligent 3 A :  Amazon.fr: Informatique">
+              <a:extLst>
+                <a:ext uri="{FF2B5EF4-FFF2-40B4-BE49-F238E27FC236}">
+                  <a16:creationId xmlns:a16="http://schemas.microsoft.com/office/drawing/2014/main" id="{E455FA7C-0C5A-EABD-0F88-3CE4CF9789AE}"/>
+                </a:ext>
+              </a:extLst>
+            </p:cNvPr>
+            <p:cNvPicPr>
+              <a:picLocks noChangeAspect="1" noChangeArrowheads="1"/>
+            </p:cNvPicPr>
+            <p:nvPr/>
+          </p:nvPicPr>
+          <p:blipFill>
+            <a:blip r:embed="rId4">
+              <a:clrChange>
+                <a:clrFrom>
+                  <a:srgbClr val="FFFFFF"/>
+                </a:clrFrom>
+                <a:clrTo>
+                  <a:srgbClr val="FFFFFF">
+                    <a:alpha val="0"/>
+                  </a:srgbClr>
+                </a:clrTo>
+              </a:clrChange>
+              <a:extLst>
+                <a:ext uri="{28A0092B-C50C-407E-A947-70E740481C1C}">
+                  <a14:useLocalDpi xmlns:a14="http://schemas.microsoft.com/office/drawing/2010/main" val="0"/>
+                </a:ext>
+              </a:extLst>
+            </a:blip>
+            <a:srcRect/>
+            <a:stretch>
+              <a:fillRect/>
+            </a:stretch>
+          </p:blipFill>
+          <p:spPr bwMode="auto">
+            <a:xfrm>
+              <a:off x="3270666" y="1944304"/>
+              <a:ext cx="2022640" cy="2045367"/>
+            </a:xfrm>
+            <a:prstGeom prst="rect">
+              <a:avLst/>
+            </a:prstGeom>
+            <a:noFill/>
+            <a:extLst>
+              <a:ext uri="{909E8E84-426E-40DD-AFC4-6F175D3DCCD1}">
+                <a14:hiddenFill xmlns:a14="http://schemas.microsoft.com/office/drawing/2010/main">
+                  <a:solidFill>
+                    <a:srgbClr val="FFFFFF"/>
+                  </a:solidFill>
+                </a14:hiddenFill>
+              </a:ext>
+            </a:extLst>
+          </p:spPr>
+        </p:pic>
+        <p:sp>
+          <p:nvSpPr>
+            <p:cNvPr id="5" name="Rectangle 4">
+              <a:extLst>
+                <a:ext uri="{FF2B5EF4-FFF2-40B4-BE49-F238E27FC236}">
+                  <a16:creationId xmlns:a16="http://schemas.microsoft.com/office/drawing/2014/main" id="{952AAFC2-20A2-D1BA-C520-BE78B1DFB4B3}"/>
+                </a:ext>
+              </a:extLst>
+            </p:cNvPr>
+            <p:cNvSpPr/>
+            <p:nvPr/>
+          </p:nvSpPr>
+          <p:spPr>
+            <a:xfrm>
+              <a:off x="4774131" y="1944303"/>
+              <a:ext cx="519175" cy="394635"/>
+            </a:xfrm>
+            <a:prstGeom prst="rect">
+              <a:avLst/>
+            </a:prstGeom>
+            <a:solidFill>
+              <a:schemeClr val="bg1"/>
+            </a:solidFill>
+            <a:ln>
+              <a:noFill/>
+            </a:ln>
+          </p:spPr>
+          <p:style>
+            <a:lnRef idx="2">
+              <a:schemeClr val="accent1">
+                <a:shade val="15000"/>
+              </a:schemeClr>
+            </a:lnRef>
+            <a:fillRef idx="1">
+              <a:schemeClr val="accent1"/>
+            </a:fillRef>
+            <a:effectRef idx="0">
+              <a:schemeClr val="accent1"/>
+            </a:effectRef>
+            <a:fontRef idx="minor">
+              <a:schemeClr val="lt1"/>
+            </a:fontRef>
+          </p:style>
+          <p:txBody>
+            <a:bodyPr rtlCol="0" anchor="ctr"/>
+            <a:lstStyle/>
+            <a:p>
+              <a:pPr algn="ctr"/>
+              <a:endParaRPr lang="fr-FR"/>
+            </a:p>
+          </p:txBody>
+        </p:sp>
+      </p:grpSp>
+      <p:sp>
+        <p:nvSpPr>
+          <p:cNvPr id="6" name="ZoneTexte 5">
+            <a:extLst>
+              <a:ext uri="{FF2B5EF4-FFF2-40B4-BE49-F238E27FC236}">
+                <a16:creationId xmlns:a16="http://schemas.microsoft.com/office/drawing/2014/main" id="{CD2DBDC7-8270-E7EA-BEA8-867BCE0E27FF}"/>
+              </a:ext>
+            </a:extLst>
+          </p:cNvPr>
+          <p:cNvSpPr txBox="1"/>
+          <p:nvPr/>
+        </p:nvSpPr>
+        <p:spPr>
+          <a:xfrm>
+            <a:off x="4351617" y="2690744"/>
+            <a:ext cx="607859" cy="276999"/>
+          </a:xfrm>
+          <a:prstGeom prst="rect">
+            <a:avLst/>
+          </a:prstGeom>
+          <a:noFill/>
+        </p:spPr>
+        <p:txBody>
+          <a:bodyPr wrap="none" rtlCol="0">
+            <a:spAutoFit/>
+          </a:bodyPr>
+          <a:lstStyle/>
+          <a:p>
+            <a:r>
+              <a:rPr lang="fr-FR" sz="1200" b="1" dirty="0" err="1"/>
+              <a:t>Zigbee</a:t>
+            </a:r>
+            <a:endParaRPr lang="fr-FR" sz="1200" b="1" dirty="0"/>
+          </a:p>
+        </p:txBody>
+      </p:sp>
+      <p:sp>
+        <p:nvSpPr>
+          <p:cNvPr id="7" name="ZoneTexte 6">
+            <a:extLst>
+              <a:ext uri="{FF2B5EF4-FFF2-40B4-BE49-F238E27FC236}">
+                <a16:creationId xmlns:a16="http://schemas.microsoft.com/office/drawing/2014/main" id="{DCA6123D-A58D-7DC5-70E0-DC6158D38691}"/>
+              </a:ext>
+            </a:extLst>
+          </p:cNvPr>
+          <p:cNvSpPr txBox="1"/>
+          <p:nvPr/>
+        </p:nvSpPr>
+        <p:spPr>
+          <a:xfrm>
+            <a:off x="5358103" y="2675083"/>
+            <a:ext cx="577850" cy="276999"/>
+          </a:xfrm>
+          <a:prstGeom prst="rect">
+            <a:avLst/>
+          </a:prstGeom>
+          <a:noFill/>
+        </p:spPr>
+        <p:txBody>
+          <a:bodyPr wrap="none" rtlCol="0">
+            <a:spAutoFit/>
+          </a:bodyPr>
+          <a:lstStyle/>
+          <a:p>
+            <a:r>
+              <a:rPr lang="fr-FR" sz="1200" b="1" dirty="0"/>
+              <a:t>MQTT</a:t>
+            </a:r>
+          </a:p>
+        </p:txBody>
+      </p:sp>
+      <p:cxnSp>
+        <p:nvCxnSpPr>
+          <p:cNvPr id="10" name="Connecteur droit avec flèche 9">
+            <a:extLst>
+              <a:ext uri="{FF2B5EF4-FFF2-40B4-BE49-F238E27FC236}">
+                <a16:creationId xmlns:a16="http://schemas.microsoft.com/office/drawing/2014/main" id="{40DA8B0D-D247-CF68-7F41-EC91A797AA83}"/>
+              </a:ext>
+            </a:extLst>
+          </p:cNvPr>
+          <p:cNvCxnSpPr/>
+          <p:nvPr/>
+        </p:nvCxnSpPr>
+        <p:spPr>
+          <a:xfrm>
+            <a:off x="4518391" y="3099493"/>
+            <a:ext cx="1386038" cy="0"/>
+          </a:xfrm>
+          <a:prstGeom prst="straightConnector1">
+            <a:avLst/>
+          </a:prstGeom>
+          <a:ln w="41275">
+            <a:solidFill>
+              <a:schemeClr val="accent5">
+                <a:lumMod val="75000"/>
+              </a:schemeClr>
+            </a:solidFill>
+            <a:headEnd type="triangle"/>
+            <a:tailEnd type="triangle"/>
+          </a:ln>
+        </p:spPr>
+        <p:style>
+          <a:lnRef idx="1">
+            <a:schemeClr val="accent1"/>
+          </a:lnRef>
+          <a:fillRef idx="0">
+            <a:schemeClr val="accent1"/>
+          </a:fillRef>
+          <a:effectRef idx="0">
+            <a:schemeClr val="accent1"/>
+          </a:effectRef>
+          <a:fontRef idx="minor">
+            <a:schemeClr val="tx1"/>
+          </a:fontRef>
+        </p:style>
+      </p:cxnSp>
+      <p:sp>
+        <p:nvSpPr>
+          <p:cNvPr id="11" name="ZoneTexte 10">
+            <a:extLst>
+              <a:ext uri="{FF2B5EF4-FFF2-40B4-BE49-F238E27FC236}">
+                <a16:creationId xmlns:a16="http://schemas.microsoft.com/office/drawing/2014/main" id="{DA66E59E-ED3F-4D04-B6BE-FC4E7E11EF95}"/>
+              </a:ext>
+            </a:extLst>
+          </p:cNvPr>
+          <p:cNvSpPr txBox="1"/>
+          <p:nvPr/>
+        </p:nvSpPr>
+        <p:spPr>
+          <a:xfrm>
+            <a:off x="6956695" y="2675082"/>
+            <a:ext cx="577850" cy="276999"/>
+          </a:xfrm>
+          <a:prstGeom prst="rect">
+            <a:avLst/>
+          </a:prstGeom>
+          <a:noFill/>
+        </p:spPr>
+        <p:txBody>
+          <a:bodyPr wrap="none" rtlCol="0">
+            <a:spAutoFit/>
+          </a:bodyPr>
+          <a:lstStyle/>
+          <a:p>
+            <a:r>
+              <a:rPr lang="fr-FR" sz="1200" b="1" dirty="0"/>
+              <a:t>MQTT</a:t>
+            </a:r>
+          </a:p>
+        </p:txBody>
+      </p:sp>
+      <p:cxnSp>
+        <p:nvCxnSpPr>
+          <p:cNvPr id="12" name="Connecteur droit avec flèche 11">
+            <a:extLst>
+              <a:ext uri="{FF2B5EF4-FFF2-40B4-BE49-F238E27FC236}">
+                <a16:creationId xmlns:a16="http://schemas.microsoft.com/office/drawing/2014/main" id="{06A0AF3A-54B2-C262-9B2B-35422049A77D}"/>
+              </a:ext>
+            </a:extLst>
+          </p:cNvPr>
+          <p:cNvCxnSpPr>
+            <a:cxnSpLocks/>
+          </p:cNvCxnSpPr>
+          <p:nvPr/>
+        </p:nvCxnSpPr>
+        <p:spPr>
+          <a:xfrm>
+            <a:off x="6956695" y="3079655"/>
+            <a:ext cx="1359532" cy="0"/>
+          </a:xfrm>
+          <a:prstGeom prst="straightConnector1">
+            <a:avLst/>
+          </a:prstGeom>
+          <a:ln w="41275">
+            <a:solidFill>
+              <a:schemeClr val="accent5">
+                <a:lumMod val="75000"/>
+              </a:schemeClr>
+            </a:solidFill>
+            <a:headEnd type="triangle"/>
+            <a:tailEnd type="triangle"/>
+          </a:ln>
+        </p:spPr>
+        <p:style>
+          <a:lnRef idx="1">
+            <a:schemeClr val="accent1"/>
+          </a:lnRef>
+          <a:fillRef idx="0">
+            <a:schemeClr val="accent1"/>
+          </a:fillRef>
+          <a:effectRef idx="0">
+            <a:schemeClr val="accent1"/>
+          </a:effectRef>
+          <a:fontRef idx="minor">
+            <a:schemeClr val="tx1"/>
+          </a:fontRef>
+        </p:style>
+      </p:cxnSp>
+      <p:pic>
+        <p:nvPicPr>
+          <p:cNvPr id="13" name="Image 12" descr="Une image contenant texte, Police&#10;&#10;Description générée automatiquement">
+            <a:extLst>
+              <a:ext uri="{FF2B5EF4-FFF2-40B4-BE49-F238E27FC236}">
+                <a16:creationId xmlns:a16="http://schemas.microsoft.com/office/drawing/2014/main" id="{EDBF2FCC-D3C8-CF8C-3C66-04A0697087F4}"/>
+              </a:ext>
+            </a:extLst>
+          </p:cNvPr>
+          <p:cNvPicPr>
+            <a:picLocks noChangeAspect="1"/>
+          </p:cNvPicPr>
+          <p:nvPr/>
+        </p:nvPicPr>
+        <p:blipFill>
+          <a:blip r:embed="rId5">
+            <a:clrChange>
+              <a:clrFrom>
+                <a:srgbClr val="FFFFFF"/>
+              </a:clrFrom>
+              <a:clrTo>
+                <a:srgbClr val="FFFFFF">
+                  <a:alpha val="0"/>
+                </a:srgbClr>
+              </a:clrTo>
+            </a:clrChange>
+          </a:blip>
+          <a:stretch>
+            <a:fillRect/>
+          </a:stretch>
+        </p:blipFill>
+        <p:spPr>
+          <a:xfrm>
+            <a:off x="8447000" y="2894388"/>
+            <a:ext cx="533369" cy="481960"/>
+          </a:xfrm>
+          <a:prstGeom prst="rect">
+            <a:avLst/>
+          </a:prstGeom>
+        </p:spPr>
+      </p:pic>
+      <p:sp>
+        <p:nvSpPr>
+          <p:cNvPr id="15" name="ZoneTexte 14">
+            <a:extLst>
+              <a:ext uri="{FF2B5EF4-FFF2-40B4-BE49-F238E27FC236}">
+                <a16:creationId xmlns:a16="http://schemas.microsoft.com/office/drawing/2014/main" id="{4521D795-B70E-003A-4961-91CCA0FF4656}"/>
+              </a:ext>
+            </a:extLst>
+          </p:cNvPr>
+          <p:cNvSpPr txBox="1"/>
+          <p:nvPr/>
+        </p:nvSpPr>
+        <p:spPr>
+          <a:xfrm>
+            <a:off x="8020315" y="2675081"/>
+            <a:ext cx="577850" cy="276999"/>
+          </a:xfrm>
+          <a:prstGeom prst="rect">
+            <a:avLst/>
+          </a:prstGeom>
+          <a:noFill/>
+        </p:spPr>
+        <p:txBody>
+          <a:bodyPr wrap="none" rtlCol="0">
+            <a:spAutoFit/>
+          </a:bodyPr>
+          <a:lstStyle/>
+          <a:p>
+            <a:r>
+              <a:rPr lang="fr-FR" sz="1200" b="1" dirty="0"/>
+              <a:t>MQTT</a:t>
+            </a:r>
+          </a:p>
+        </p:txBody>
+      </p:sp>
+    </p:spTree>
+    <p:extLst>
+      <p:ext uri="{BB962C8B-B14F-4D97-AF65-F5344CB8AC3E}">
+        <p14:creationId xmlns:p14="http://schemas.microsoft.com/office/powerpoint/2010/main" val="101558293"/>
+      </p:ext>
+    </p:extLst>
+  </p:cSld>
+  <p:clrMapOvr>
+    <a:masterClrMapping/>
+  </p:clrMapOvr>
+</p:sld>
+</file>
+
 <file path=ppt/theme/theme1.xml><?xml version="1.0" encoding="utf-8"?>
 <a:theme xmlns:a="http://schemas.openxmlformats.org/drawingml/2006/main" name="Thème Office">
   <a:themeElements>

</xml_diff>